<commit_message>
Updated with additional simulations.
Signed-off-by: David Brainard <brainard@psych.upenn.edu>
</commit_message>
<xml_diff>
--- a/colorContours/presentations/EarlyResultsSeptember2013.pptx
+++ b/colorContours/presentations/EarlyResultsSeptember2013.pptx
@@ -6,8 +6,10 @@
   </p:sldMasterIdLst>
   <p:sldIdLst>
     <p:sldId id="257" r:id="rId2"/>
-    <p:sldId id="258" r:id="rId3"/>
+    <p:sldId id="260" r:id="rId3"/>
     <p:sldId id="259" r:id="rId4"/>
+    <p:sldId id="261" r:id="rId5"/>
+    <p:sldId id="258" r:id="rId6"/>
   </p:sldIdLst>
   <p:sldSz cx="9144000" cy="6858000" type="screen4x3"/>
   <p:notesSz cx="6858000" cy="9144000"/>
@@ -3106,7 +3108,7 @@
         <p:spPr>
           <a:xfrm>
             <a:off x="77202" y="5167513"/>
-            <a:ext cx="4325147" cy="1569660"/>
+            <a:ext cx="4397433" cy="1754327"/>
           </a:xfrm>
           <a:prstGeom prst="rect">
             <a:avLst/>
@@ -3121,45 +3123,13 @@
           <a:p>
             <a:r>
               <a:rPr lang="en-US" sz="1200" dirty="0" smtClean="0"/>
-              <a:t>Early simulations, </a:t>
-            </a:r>
+              <a:t>Early simulations, 9/2/13</a:t>
+            </a:r>
+          </a:p>
+          <a:p>
             <a:r>
               <a:rPr lang="en-US" sz="1200" dirty="0" smtClean="0"/>
-              <a:t>9/2/</a:t>
-            </a:r>
-            <a:r>
-              <a:rPr lang="en-US" sz="1200" dirty="0" smtClean="0"/>
-              <a:t>13</a:t>
-            </a:r>
-          </a:p>
-          <a:p>
-            <a:r>
-              <a:rPr lang="en-US" sz="1200" dirty="0" smtClean="0"/>
-              <a:t>Trichromats: </a:t>
-            </a:r>
-            <a:r>
-              <a:rPr lang="en-US" sz="1200" dirty="0" smtClean="0"/>
-              <a:t>4 </a:t>
-            </a:r>
-            <a:r>
-              <a:rPr lang="en-US" sz="1200" dirty="0" smtClean="0"/>
-              <a:t>L, </a:t>
-            </a:r>
-            <a:r>
-              <a:rPr lang="en-US" sz="1200" dirty="0" smtClean="0"/>
-              <a:t> 2 M</a:t>
-            </a:r>
-            <a:r>
-              <a:rPr lang="en-US" sz="1200" dirty="0" smtClean="0"/>
-              <a:t>, </a:t>
-            </a:r>
-            <a:r>
-              <a:rPr lang="en-US" sz="1200" dirty="0" smtClean="0"/>
-              <a:t>1 S </a:t>
-            </a:r>
-            <a:r>
-              <a:rPr lang="en-US" sz="1200" dirty="0" smtClean="0"/>
-              <a:t>cone.  Poisson noise.  TAFC.</a:t>
+              <a:t>Trichromats: 4 L,  2 M, 1 S cone.  Poisson noise.  TAFC.</a:t>
             </a:r>
           </a:p>
           <a:p>
@@ -3187,15 +3157,7 @@
             </a:r>
             <a:r>
               <a:rPr lang="en-US" sz="1200" dirty="0" smtClean="0"/>
-              <a:t> </a:t>
-            </a:r>
-            <a:r>
-              <a:rPr lang="en-US" sz="1200" dirty="0" smtClean="0"/>
-              <a:t>6 </a:t>
-            </a:r>
-            <a:r>
-              <a:rPr lang="en-US" sz="1200" dirty="0" smtClean="0"/>
-              <a:t>M, 1S (</a:t>
+              <a:t> 6 M, 1S (</a:t>
             </a:r>
             <a:r>
               <a:rPr lang="en-US" sz="1200" dirty="0" err="1" smtClean="0"/>
@@ -3203,23 +3165,7 @@
             </a:r>
             <a:r>
               <a:rPr lang="en-US" sz="1200" dirty="0" smtClean="0"/>
-              <a:t>), </a:t>
-            </a:r>
-            <a:r>
-              <a:rPr lang="en-US" sz="1200" dirty="0" smtClean="0"/>
-              <a:t>6 L</a:t>
-            </a:r>
-            <a:r>
-              <a:rPr lang="en-US" sz="1200" dirty="0" smtClean="0"/>
-              <a:t>, </a:t>
-            </a:r>
-            <a:r>
-              <a:rPr lang="en-US" sz="1200" dirty="0" smtClean="0"/>
-              <a:t>1 S </a:t>
-            </a:r>
-            <a:r>
-              <a:rPr lang="en-US" sz="1200" dirty="0" smtClean="0"/>
-              <a:t>(</a:t>
+              <a:t>), 6 L, 1 S (</a:t>
             </a:r>
             <a:r>
               <a:rPr lang="en-US" sz="1200" dirty="0" err="1" smtClean="0"/>
@@ -3232,32 +3178,91 @@
           </a:p>
           <a:p>
             <a:r>
-              <a:rPr lang="en-US" sz="1200" dirty="0" smtClean="0"/>
-              <a:t>This </a:t>
-            </a:r>
-            <a:r>
-              <a:rPr lang="en-US" sz="1200" dirty="0" smtClean="0"/>
-              <a:t>should lead </a:t>
-            </a:r>
-            <a:r>
-              <a:rPr lang="en-US" sz="1200" dirty="0" smtClean="0"/>
-              <a:t>to slightly higher dichromatic sensitivity in the</a:t>
-            </a:r>
-          </a:p>
-          <a:p>
-            <a:r>
-              <a:rPr lang="en-US" sz="1200" dirty="0"/>
+              <a:rPr lang="en-US" sz="1200" dirty="0" smtClean="0">
+                <a:solidFill>
+                  <a:srgbClr val="FF0000"/>
+                </a:solidFill>
+              </a:rPr>
+              <a:t>This should lead to slightly higher dichromatic sensitivity in the</a:t>
+            </a:r>
+          </a:p>
+          <a:p>
+            <a:r>
+              <a:rPr lang="en-US" sz="1200" dirty="0">
+                <a:solidFill>
+                  <a:srgbClr val="FF0000"/>
+                </a:solidFill>
+              </a:rPr>
               <a:t> </a:t>
             </a:r>
             <a:r>
-              <a:rPr lang="en-US" sz="1200" dirty="0" smtClean="0"/>
-              <a:t> relevant isolating direction.  </a:t>
-            </a:r>
-            <a:r>
-              <a:rPr lang="en-US" sz="1200" dirty="0" smtClean="0"/>
-              <a:t>Yes for M, not so much for L (?)</a:t>
-            </a:r>
-            <a:endParaRPr lang="en-US" sz="1200" dirty="0"/>
+              <a:rPr lang="en-US" sz="1200" dirty="0" smtClean="0">
+                <a:solidFill>
+                  <a:srgbClr val="FF0000"/>
+                </a:solidFill>
+              </a:rPr>
+              <a:t> relevant isolating direction.  Yes for M, not so much for </a:t>
+            </a:r>
+            <a:r>
+              <a:rPr lang="en-US" sz="1200" dirty="0" smtClean="0">
+                <a:solidFill>
+                  <a:srgbClr val="FF0000"/>
+                </a:solidFill>
+              </a:rPr>
+              <a:t>L.  The </a:t>
+            </a:r>
+            <a:r>
+              <a:rPr lang="en-US" sz="1200" dirty="0" err="1" smtClean="0">
+                <a:solidFill>
+                  <a:srgbClr val="FF0000"/>
+                </a:solidFill>
+              </a:rPr>
+              <a:t>sqrt</a:t>
+            </a:r>
+            <a:endParaRPr lang="en-US" sz="1200" dirty="0">
+              <a:solidFill>
+                <a:srgbClr val="FF0000"/>
+              </a:solidFill>
+            </a:endParaRPr>
+          </a:p>
+          <a:p>
+            <a:r>
+              <a:rPr lang="en-US" sz="1200" dirty="0">
+                <a:solidFill>
+                  <a:srgbClr val="FF0000"/>
+                </a:solidFill>
+              </a:rPr>
+              <a:t> </a:t>
+            </a:r>
+            <a:r>
+              <a:rPr lang="en-US" sz="1200" dirty="0" smtClean="0">
+                <a:solidFill>
+                  <a:srgbClr val="FF0000"/>
+                </a:solidFill>
+              </a:rPr>
+              <a:t> of 1.5 is less than the </a:t>
+            </a:r>
+            <a:r>
+              <a:rPr lang="en-US" sz="1200" dirty="0" err="1" smtClean="0">
+                <a:solidFill>
+                  <a:srgbClr val="FF0000"/>
+                </a:solidFill>
+              </a:rPr>
+              <a:t>sqrt</a:t>
+            </a:r>
+            <a:r>
+              <a:rPr lang="en-US" sz="1200" dirty="0" smtClean="0">
+                <a:solidFill>
+                  <a:srgbClr val="FF0000"/>
+                </a:solidFill>
+              </a:rPr>
+              <a:t> of 2.  That might be some of it.</a:t>
+            </a:r>
+            <a:endParaRPr lang="en-US" sz="1200" dirty="0">
+              <a:solidFill>
+                <a:srgbClr val="FF0000"/>
+              </a:solidFill>
+            </a:endParaRPr>
           </a:p>
         </p:txBody>
       </p:sp>
@@ -3434,7 +3439,7 @@
           </a:prstGeom>
           <a:ln w="6350" cmpd="sng">
             <a:solidFill>
-              <a:schemeClr val="tx1"/>
+              <a:srgbClr val="4F81BD"/>
             </a:solidFill>
             <a:prstDash val="dot"/>
           </a:ln>
@@ -3471,7 +3476,7 @@
           </a:prstGeom>
           <a:ln w="6350" cmpd="sng">
             <a:solidFill>
-              <a:schemeClr val="tx1"/>
+              <a:srgbClr val="4F81BD"/>
             </a:solidFill>
             <a:prstDash val="dot"/>
           </a:ln>
@@ -3508,7 +3513,7 @@
           </a:prstGeom>
           <a:ln w="6350" cmpd="sng">
             <a:solidFill>
-              <a:schemeClr val="tx1"/>
+              <a:srgbClr val="4F81BD"/>
             </a:solidFill>
             <a:prstDash val="dot"/>
           </a:ln>
@@ -3545,7 +3550,7 @@
           </a:prstGeom>
           <a:ln w="6350" cmpd="sng">
             <a:solidFill>
-              <a:schemeClr val="tx1"/>
+              <a:srgbClr val="4F81BD"/>
             </a:solidFill>
             <a:prstDash val="dot"/>
           </a:ln>
@@ -3604,8 +3609,8 @@
         </p:nvSpPr>
         <p:spPr>
           <a:xfrm>
-            <a:off x="77202" y="5167513"/>
-            <a:ext cx="4469868" cy="1384995"/>
+            <a:off x="77202" y="4722985"/>
+            <a:ext cx="4202593" cy="2123658"/>
           </a:xfrm>
           <a:prstGeom prst="rect">
             <a:avLst/>
@@ -3620,45 +3625,13 @@
           <a:p>
             <a:r>
               <a:rPr lang="en-US" sz="1200" dirty="0" smtClean="0"/>
-              <a:t>Early simulations, </a:t>
-            </a:r>
+              <a:t>Early simulations, 9/2/13</a:t>
+            </a:r>
+          </a:p>
+          <a:p>
             <a:r>
               <a:rPr lang="en-US" sz="1200" dirty="0" smtClean="0"/>
-              <a:t>9/2/</a:t>
-            </a:r>
-            <a:r>
-              <a:rPr lang="en-US" sz="1200" dirty="0" smtClean="0"/>
-              <a:t>13</a:t>
-            </a:r>
-          </a:p>
-          <a:p>
-            <a:r>
-              <a:rPr lang="en-US" sz="1200" dirty="0" smtClean="0"/>
-              <a:t>Trichromats: </a:t>
-            </a:r>
-            <a:r>
-              <a:rPr lang="en-US" sz="1200" dirty="0" smtClean="0"/>
-              <a:t>4 </a:t>
-            </a:r>
-            <a:r>
-              <a:rPr lang="en-US" sz="1200" dirty="0" smtClean="0"/>
-              <a:t>L, </a:t>
-            </a:r>
-            <a:r>
-              <a:rPr lang="en-US" sz="1200" dirty="0" smtClean="0"/>
-              <a:t> 2 M</a:t>
-            </a:r>
-            <a:r>
-              <a:rPr lang="en-US" sz="1200" dirty="0" smtClean="0"/>
-              <a:t>, </a:t>
-            </a:r>
-            <a:r>
-              <a:rPr lang="en-US" sz="1200" dirty="0" smtClean="0"/>
-              <a:t>1 S </a:t>
-            </a:r>
-            <a:r>
-              <a:rPr lang="en-US" sz="1200" dirty="0" smtClean="0"/>
-              <a:t>cone.  Poisson noise.  TAFC.</a:t>
+              <a:t>Trichromats: 4 L,  2 M, 1 S cone.  Poisson noise.  TAFC.</a:t>
             </a:r>
           </a:p>
           <a:p>
@@ -3670,32 +3643,116 @@
           <a:p>
             <a:r>
               <a:rPr lang="en-US" sz="1200" dirty="0" smtClean="0"/>
-              <a:t>Apple LCD primaries, about 60 cd/m2 mean </a:t>
-            </a:r>
+              <a:t>Apple LCD primaries, about 60 cd/m2 mean luminance</a:t>
+            </a:r>
+          </a:p>
+          <a:p>
             <a:r>
               <a:rPr lang="en-US" sz="1200" dirty="0" smtClean="0"/>
-              <a:t>luminance</a:t>
+              <a:t>Cone specific L/M surrounds, 0.7 surround weight.</a:t>
             </a:r>
           </a:p>
           <a:p>
             <a:r>
               <a:rPr lang="en-US" sz="1200" dirty="0" smtClean="0"/>
-              <a:t>Upper right panel, SVM at cones.</a:t>
-            </a:r>
-          </a:p>
-          <a:p>
+              <a:t>Gaussian noise at second site, </a:t>
+            </a:r>
+            <a:r>
+              <a:rPr lang="en-US" sz="1200" dirty="0" err="1" smtClean="0"/>
+              <a:t>Fano</a:t>
+            </a:r>
             <a:r>
               <a:rPr lang="en-US" sz="1200" dirty="0" smtClean="0"/>
-              <a:t>Upper left and lower right panels (both same), SVM at opponent site.</a:t>
+              <a:t> factor </a:t>
+            </a:r>
+            <a:r>
+              <a:rPr lang="en-US" sz="1200" dirty="0" smtClean="0"/>
+              <a:t>4.</a:t>
             </a:r>
             <a:endParaRPr lang="en-US" sz="1200" dirty="0" smtClean="0"/>
           </a:p>
           <a:p>
             <a:r>
               <a:rPr lang="en-US" sz="1200" dirty="0" smtClean="0"/>
-              <a:t>This has little if any effect.  That is as it should be.</a:t>
-            </a:r>
-            <a:endParaRPr lang="en-US" sz="1200" dirty="0"/>
+              <a:t>These are replacement dichromats, so the have:</a:t>
+            </a:r>
+          </a:p>
+          <a:p>
+            <a:r>
+              <a:rPr lang="en-US" sz="1200" dirty="0"/>
+              <a:t> </a:t>
+            </a:r>
+            <a:r>
+              <a:rPr lang="en-US" sz="1200" dirty="0" smtClean="0"/>
+              <a:t> 6 M, 1S (</a:t>
+            </a:r>
+            <a:r>
+              <a:rPr lang="en-US" sz="1200" dirty="0" err="1" smtClean="0"/>
+              <a:t>protanope</a:t>
+            </a:r>
+            <a:r>
+              <a:rPr lang="en-US" sz="1200" dirty="0" smtClean="0"/>
+              <a:t>), 6 L, 1 S (</a:t>
+            </a:r>
+            <a:r>
+              <a:rPr lang="en-US" sz="1200" dirty="0" err="1" smtClean="0"/>
+              <a:t>deuteranope</a:t>
+            </a:r>
+            <a:r>
+              <a:rPr lang="en-US" sz="1200" dirty="0" smtClean="0"/>
+              <a:t>)</a:t>
+            </a:r>
+          </a:p>
+          <a:p>
+            <a:r>
+              <a:rPr lang="en-US" sz="1200" dirty="0" smtClean="0">
+                <a:solidFill>
+                  <a:srgbClr val="FF0000"/>
+                </a:solidFill>
+              </a:rPr>
+              <a:t>For this model, the dichromats are less sensitive than the</a:t>
+            </a:r>
+          </a:p>
+          <a:p>
+            <a:r>
+              <a:rPr lang="en-US" sz="1200" dirty="0">
+                <a:solidFill>
+                  <a:srgbClr val="FF0000"/>
+                </a:solidFill>
+              </a:rPr>
+              <a:t> </a:t>
+            </a:r>
+            <a:r>
+              <a:rPr lang="en-US" sz="1200" dirty="0" smtClean="0">
+                <a:solidFill>
+                  <a:srgbClr val="FF0000"/>
+                </a:solidFill>
+              </a:rPr>
+              <a:t> trichromats in all color directions.  I think this makes sense,</a:t>
+            </a:r>
+          </a:p>
+          <a:p>
+            <a:r>
+              <a:rPr lang="en-US" sz="1200" dirty="0">
+                <a:solidFill>
+                  <a:srgbClr val="FF0000"/>
+                </a:solidFill>
+              </a:rPr>
+              <a:t> </a:t>
+            </a:r>
+            <a:r>
+              <a:rPr lang="en-US" sz="1200" dirty="0" smtClean="0">
+                <a:solidFill>
+                  <a:srgbClr val="FF0000"/>
+                </a:solidFill>
+              </a:rPr>
+              <a:t> although I don’t yet have a clean formal argument.</a:t>
+            </a:r>
+            <a:endParaRPr lang="en-US" sz="1200" dirty="0" smtClean="0">
+              <a:solidFill>
+                <a:srgbClr val="FF0000"/>
+              </a:solidFill>
+            </a:endParaRPr>
           </a:p>
         </p:txBody>
       </p:sp>
@@ -3708,7 +3765,7 @@
         <p:spPr>
           <a:xfrm>
             <a:off x="203516" y="154684"/>
-            <a:ext cx="4635516" cy="369332"/>
+            <a:ext cx="6147837" cy="369332"/>
           </a:xfrm>
           <a:prstGeom prst="rect">
             <a:avLst/>
@@ -3723,7 +3780,15 @@
           <a:p>
             <a:r>
               <a:rPr lang="en-US" dirty="0" smtClean="0"/>
-              <a:t>SVM at Opponent Site, No Opponent Site Noise</a:t>
+              <a:t>SVM at Second Site, </a:t>
+            </a:r>
+            <a:r>
+              <a:rPr lang="en-US" dirty="0" smtClean="0"/>
+              <a:t>Second </a:t>
+            </a:r>
+            <a:r>
+              <a:rPr lang="en-US" dirty="0" smtClean="0"/>
+              <a:t>Site Noise, Cone Specific Surrounds</a:t>
             </a:r>
             <a:endParaRPr lang="en-US" dirty="0"/>
           </a:p>
@@ -3731,7 +3796,7 @@
       </p:sp>
       <p:pic>
         <p:nvPicPr>
-          <p:cNvPr id="5" name="Picture 4" descr="colorContour_LMandS_TAFC_0.png"/>
+          <p:cNvPr id="13" name="Picture 12" descr="colorContour_LMandS_TAFC_0.png"/>
           <p:cNvPicPr>
             <a:picLocks noChangeAspect="1"/>
           </p:cNvPicPr>
@@ -3751,8 +3816,8 @@
         </p:blipFill>
         <p:spPr>
           <a:xfrm>
-            <a:off x="4402349" y="871931"/>
-            <a:ext cx="3657357" cy="2743017"/>
+            <a:off x="4342385" y="814451"/>
+            <a:ext cx="3658616" cy="2743962"/>
           </a:xfrm>
           <a:prstGeom prst="rect">
             <a:avLst/>
@@ -3761,7 +3826,7 @@
       </p:pic>
       <p:pic>
         <p:nvPicPr>
-          <p:cNvPr id="15" name="Picture 14" descr="colorContour_LMandS_TAFC_0.png"/>
+          <p:cNvPr id="15" name="Picture 14" descr="colorContour_LSonly_TAFC_0.png"/>
           <p:cNvPicPr>
             <a:picLocks noChangeAspect="1"/>
           </p:cNvPicPr>
@@ -3781,8 +3846,8 @@
         </p:blipFill>
         <p:spPr>
           <a:xfrm>
-            <a:off x="4402349" y="3941288"/>
-            <a:ext cx="3657357" cy="2743017"/>
+            <a:off x="4342385" y="3875070"/>
+            <a:ext cx="3658616" cy="2743962"/>
           </a:xfrm>
           <a:prstGeom prst="rect">
             <a:avLst/>
@@ -3791,14 +3856,14 @@
       </p:pic>
       <p:pic>
         <p:nvPicPr>
-          <p:cNvPr id="16" name="Picture 15" descr="colorContour_LMandS_TAFC_0.png"/>
+          <p:cNvPr id="17" name="Picture 16" descr="colorContour_MSonly_TAFC_0.png"/>
           <p:cNvPicPr>
             <a:picLocks noChangeAspect="1"/>
           </p:cNvPicPr>
           <p:nvPr/>
         </p:nvPicPr>
         <p:blipFill>
-          <a:blip r:embed="rId3">
+          <a:blip r:embed="rId4">
             <a:extLst>
               <a:ext uri="{28A0092B-C50C-407E-A947-70E740481C1C}">
                 <a14:useLocalDpi xmlns:a14="http://schemas.microsoft.com/office/drawing/2010/main" val="0"/>
@@ -3811,8 +3876,8 @@
         </p:blipFill>
         <p:spPr>
           <a:xfrm>
-            <a:off x="764649" y="871931"/>
-            <a:ext cx="3657357" cy="2743017"/>
+            <a:off x="698509" y="814451"/>
+            <a:ext cx="3658616" cy="2743962"/>
           </a:xfrm>
           <a:prstGeom prst="rect">
             <a:avLst/>
@@ -3827,7 +3892,7 @@
         </p:nvCxnSpPr>
         <p:spPr>
           <a:xfrm flipV="1">
-            <a:off x="6407680" y="1352925"/>
+            <a:off x="6756556" y="1352925"/>
             <a:ext cx="0" cy="5121193"/>
           </a:xfrm>
           <a:prstGeom prst="line">
@@ -3835,7 +3900,7 @@
           </a:prstGeom>
           <a:ln w="6350" cmpd="sng">
             <a:solidFill>
-              <a:schemeClr val="tx1"/>
+              <a:srgbClr val="4F81BD"/>
             </a:solidFill>
             <a:prstDash val="dot"/>
           </a:ln>
@@ -3864,7 +3929,7 @@
         </p:nvCxnSpPr>
         <p:spPr>
           <a:xfrm flipV="1">
-            <a:off x="6040080" y="1405315"/>
+            <a:off x="5753132" y="1357687"/>
             <a:ext cx="0" cy="5121193"/>
           </a:xfrm>
           <a:prstGeom prst="line">
@@ -3872,7 +3937,7 @@
           </a:prstGeom>
           <a:ln w="6350" cmpd="sng">
             <a:solidFill>
-              <a:schemeClr val="tx1"/>
+              <a:srgbClr val="4F81BD"/>
             </a:solidFill>
             <a:prstDash val="dot"/>
           </a:ln>
@@ -3895,21 +3960,21 @@
       </p:cxnSp>
       <p:cxnSp>
         <p:nvCxnSpPr>
-          <p:cNvPr id="13" name="Straight Connector 12"/>
+          <p:cNvPr id="20" name="Straight Connector 19"/>
           <p:cNvCxnSpPr/>
           <p:nvPr/>
         </p:nvCxnSpPr>
         <p:spPr>
-          <a:xfrm rot="16200000" flipV="1">
-            <a:off x="3942434" y="-692452"/>
-            <a:ext cx="0" cy="5121193"/>
+          <a:xfrm flipH="1">
+            <a:off x="1381580" y="1561425"/>
+            <a:ext cx="5374978" cy="1"/>
           </a:xfrm>
           <a:prstGeom prst="line">
             <a:avLst/>
           </a:prstGeom>
           <a:ln w="6350" cmpd="sng">
             <a:solidFill>
-              <a:schemeClr val="tx1"/>
+              <a:srgbClr val="4F81BD"/>
             </a:solidFill>
             <a:prstDash val="dot"/>
           </a:ln>
@@ -3932,21 +3997,21 @@
       </p:cxnSp>
       <p:cxnSp>
         <p:nvCxnSpPr>
-          <p:cNvPr id="14" name="Straight Connector 13"/>
+          <p:cNvPr id="21" name="Straight Connector 20"/>
           <p:cNvCxnSpPr/>
           <p:nvPr/>
         </p:nvCxnSpPr>
         <p:spPr>
-          <a:xfrm rot="16200000" flipV="1">
-            <a:off x="3962434" y="-15"/>
-            <a:ext cx="0" cy="5121193"/>
+          <a:xfrm flipH="1">
+            <a:off x="1401902" y="2744584"/>
+            <a:ext cx="5354654" cy="0"/>
           </a:xfrm>
           <a:prstGeom prst="line">
             <a:avLst/>
           </a:prstGeom>
           <a:ln w="6350" cmpd="sng">
             <a:solidFill>
-              <a:schemeClr val="tx1"/>
+              <a:srgbClr val="4F81BD"/>
             </a:solidFill>
             <a:prstDash val="dot"/>
           </a:ln>
@@ -3970,7 +4035,7 @@
     </p:spTree>
     <p:extLst>
       <p:ext uri="{BB962C8B-B14F-4D97-AF65-F5344CB8AC3E}">
-        <p14:creationId xmlns:p14="http://schemas.microsoft.com/office/powerpoint/2010/main" val="1909455126"/>
+        <p14:creationId xmlns:p14="http://schemas.microsoft.com/office/powerpoint/2010/main" val="45872738"/>
       </p:ext>
     </p:extLst>
   </p:cSld>
@@ -4005,8 +4070,8 @@
         </p:nvSpPr>
         <p:spPr>
           <a:xfrm>
-            <a:off x="77202" y="5167513"/>
-            <a:ext cx="4202593" cy="1569660"/>
+            <a:off x="77202" y="4802388"/>
+            <a:ext cx="4262705" cy="1938992"/>
           </a:xfrm>
           <a:prstGeom prst="rect">
             <a:avLst/>
@@ -4021,45 +4086,13 @@
           <a:p>
             <a:r>
               <a:rPr lang="en-US" sz="1200" dirty="0" smtClean="0"/>
-              <a:t>Early simulations, </a:t>
-            </a:r>
+              <a:t>Early simulations, 9/2/13</a:t>
+            </a:r>
+          </a:p>
+          <a:p>
             <a:r>
               <a:rPr lang="en-US" sz="1200" dirty="0" smtClean="0"/>
-              <a:t>9/2/</a:t>
-            </a:r>
-            <a:r>
-              <a:rPr lang="en-US" sz="1200" dirty="0" smtClean="0"/>
-              <a:t>13</a:t>
-            </a:r>
-          </a:p>
-          <a:p>
-            <a:r>
-              <a:rPr lang="en-US" sz="1200" dirty="0" smtClean="0"/>
-              <a:t>Trichromats: </a:t>
-            </a:r>
-            <a:r>
-              <a:rPr lang="en-US" sz="1200" dirty="0" smtClean="0"/>
-              <a:t>4 </a:t>
-            </a:r>
-            <a:r>
-              <a:rPr lang="en-US" sz="1200" dirty="0" smtClean="0"/>
-              <a:t>L, </a:t>
-            </a:r>
-            <a:r>
-              <a:rPr lang="en-US" sz="1200" dirty="0" smtClean="0"/>
-              <a:t> 2 M</a:t>
-            </a:r>
-            <a:r>
-              <a:rPr lang="en-US" sz="1200" dirty="0" smtClean="0"/>
-              <a:t>, </a:t>
-            </a:r>
-            <a:r>
-              <a:rPr lang="en-US" sz="1200" dirty="0" smtClean="0"/>
-              <a:t>1 S </a:t>
-            </a:r>
-            <a:r>
-              <a:rPr lang="en-US" sz="1200" dirty="0" smtClean="0"/>
-              <a:t>cone.  Poisson noise.  TAFC.</a:t>
+              <a:t>Trichromats: 4 L,  2 M, 1 S cone.  Poisson noise.  TAFC.</a:t>
             </a:r>
           </a:p>
           <a:p>
@@ -4071,21 +4104,13 @@
           <a:p>
             <a:r>
               <a:rPr lang="en-US" sz="1200" dirty="0" smtClean="0"/>
-              <a:t>Apple LCD primaries, about 60 cd/m2 mean </a:t>
-            </a:r>
+              <a:t>Apple LCD primaries, about 60 cd/m2 mean luminance</a:t>
+            </a:r>
+          </a:p>
+          <a:p>
             <a:r>
               <a:rPr lang="en-US" sz="1200" dirty="0" smtClean="0"/>
-              <a:t>luminance</a:t>
-            </a:r>
-          </a:p>
-          <a:p>
-            <a:r>
-              <a:rPr lang="en-US" sz="1200" smtClean="0"/>
-              <a:t>Cone specific L</a:t>
-            </a:r>
-            <a:r>
-              <a:rPr lang="en-US" sz="1200" dirty="0" smtClean="0"/>
-              <a:t>/M surrounds, 0.7 surround weight.</a:t>
+              <a:t>Cone specific L/M surrounds, 0.7 surround weight.</a:t>
             </a:r>
           </a:p>
           <a:p>
@@ -4101,7 +4126,6 @@
               <a:rPr lang="en-US" sz="1200" dirty="0" smtClean="0"/>
               <a:t> factor 1.</a:t>
             </a:r>
-            <a:endParaRPr lang="en-US" sz="1200" dirty="0" smtClean="0"/>
           </a:p>
           <a:p>
             <a:r>
@@ -4116,15 +4140,7 @@
             </a:r>
             <a:r>
               <a:rPr lang="en-US" sz="1200" dirty="0" smtClean="0"/>
-              <a:t> </a:t>
-            </a:r>
-            <a:r>
-              <a:rPr lang="en-US" sz="1200" dirty="0" smtClean="0"/>
-              <a:t>6 </a:t>
-            </a:r>
-            <a:r>
-              <a:rPr lang="en-US" sz="1200" dirty="0" smtClean="0"/>
-              <a:t>M, 1S (</a:t>
+              <a:t> 6 M, 1S (</a:t>
             </a:r>
             <a:r>
               <a:rPr lang="en-US" sz="1200" dirty="0" err="1" smtClean="0"/>
@@ -4132,23 +4148,7 @@
             </a:r>
             <a:r>
               <a:rPr lang="en-US" sz="1200" dirty="0" smtClean="0"/>
-              <a:t>), </a:t>
-            </a:r>
-            <a:r>
-              <a:rPr lang="en-US" sz="1200" dirty="0" smtClean="0"/>
-              <a:t>6 L</a:t>
-            </a:r>
-            <a:r>
-              <a:rPr lang="en-US" sz="1200" dirty="0" smtClean="0"/>
-              <a:t>, </a:t>
-            </a:r>
-            <a:r>
-              <a:rPr lang="en-US" sz="1200" dirty="0" smtClean="0"/>
-              <a:t>1 S </a:t>
-            </a:r>
-            <a:r>
-              <a:rPr lang="en-US" sz="1200" dirty="0" smtClean="0"/>
-              <a:t>(</a:t>
+              <a:t>), 6 L, 1 S (</a:t>
             </a:r>
             <a:r>
               <a:rPr lang="en-US" sz="1200" dirty="0" err="1" smtClean="0"/>
@@ -4158,7 +4158,39 @@
               <a:rPr lang="en-US" sz="1200" dirty="0" smtClean="0"/>
               <a:t>)</a:t>
             </a:r>
-            <a:endParaRPr lang="en-US" sz="1200" dirty="0" smtClean="0"/>
+          </a:p>
+          <a:p>
+            <a:r>
+              <a:rPr lang="en-US" sz="1200" dirty="0" smtClean="0">
+                <a:solidFill>
+                  <a:srgbClr val="FF0000"/>
+                </a:solidFill>
+              </a:rPr>
+              <a:t>Perhaps not surprisingly, this seems in between the SVM at the </a:t>
+            </a:r>
+          </a:p>
+          <a:p>
+            <a:r>
+              <a:rPr lang="en-US" sz="1200" dirty="0">
+                <a:solidFill>
+                  <a:srgbClr val="FF0000"/>
+                </a:solidFill>
+              </a:rPr>
+              <a:t> </a:t>
+            </a:r>
+            <a:r>
+              <a:rPr lang="en-US" sz="1200" dirty="0" smtClean="0">
+                <a:solidFill>
+                  <a:srgbClr val="FF0000"/>
+                </a:solidFill>
+              </a:rPr>
+              <a:t> cones and the case where there is more noise at the second site.</a:t>
+            </a:r>
+            <a:endParaRPr lang="en-US" sz="1200" dirty="0" smtClean="0">
+              <a:solidFill>
+                <a:srgbClr val="FF0000"/>
+              </a:solidFill>
+            </a:endParaRPr>
           </a:p>
         </p:txBody>
       </p:sp>
@@ -4171,7 +4203,7 @@
         <p:spPr>
           <a:xfrm>
             <a:off x="203516" y="154684"/>
-            <a:ext cx="6096541" cy="369332"/>
+            <a:ext cx="6538756" cy="369332"/>
           </a:xfrm>
           <a:prstGeom prst="rect">
             <a:avLst/>
@@ -4186,7 +4218,15 @@
           <a:p>
             <a:r>
               <a:rPr lang="en-US" dirty="0" smtClean="0"/>
-              <a:t>SVM at Second Site, Second Site Noise, Cone Specific Surrounds</a:t>
+              <a:t>SVM at Second Site, </a:t>
+            </a:r>
+            <a:r>
+              <a:rPr lang="en-US" dirty="0" smtClean="0"/>
+              <a:t>Less Second </a:t>
+            </a:r>
+            <a:r>
+              <a:rPr lang="en-US" dirty="0" smtClean="0"/>
+              <a:t>Site Noise, Cone Specific Surrounds</a:t>
             </a:r>
             <a:endParaRPr lang="en-US" dirty="0"/>
           </a:p>
@@ -4298,7 +4338,7 @@
           </a:prstGeom>
           <a:ln w="6350" cmpd="sng">
             <a:solidFill>
-              <a:schemeClr val="tx1"/>
+              <a:srgbClr val="4F81BD"/>
             </a:solidFill>
             <a:prstDash val="dot"/>
           </a:ln>
@@ -4327,7 +4367,7 @@
         </p:nvCxnSpPr>
         <p:spPr>
           <a:xfrm flipV="1">
-            <a:off x="5935706" y="1405315"/>
+            <a:off x="5967458" y="1405315"/>
             <a:ext cx="0" cy="5121193"/>
           </a:xfrm>
           <a:prstGeom prst="line">
@@ -4335,7 +4375,7 @@
           </a:prstGeom>
           <a:ln w="6350" cmpd="sng">
             <a:solidFill>
-              <a:schemeClr val="tx1"/>
+              <a:srgbClr val="4F81BD"/>
             </a:solidFill>
             <a:prstDash val="dot"/>
           </a:ln>
@@ -4364,7 +4404,7 @@
         </p:nvCxnSpPr>
         <p:spPr>
           <a:xfrm rot="16200000" flipV="1">
-            <a:off x="3783416" y="-753093"/>
+            <a:off x="3783416" y="-697527"/>
             <a:ext cx="0" cy="5121193"/>
           </a:xfrm>
           <a:prstGeom prst="line">
@@ -4372,7 +4412,7 @@
           </a:prstGeom>
           <a:ln w="6350" cmpd="sng">
             <a:solidFill>
-              <a:schemeClr val="tx1"/>
+              <a:srgbClr val="4F81BD"/>
             </a:solidFill>
             <a:prstDash val="dot"/>
           </a:ln>
@@ -4401,7 +4441,7 @@
         </p:nvCxnSpPr>
         <p:spPr>
           <a:xfrm rot="16200000" flipV="1">
-            <a:off x="3803737" y="9351"/>
+            <a:off x="3803737" y="-14463"/>
             <a:ext cx="0" cy="5121193"/>
           </a:xfrm>
           <a:prstGeom prst="line">
@@ -4409,7 +4449,7 @@
           </a:prstGeom>
           <a:ln w="6350" cmpd="sng">
             <a:solidFill>
-              <a:schemeClr val="tx1"/>
+              <a:srgbClr val="4F81BD"/>
             </a:solidFill>
             <a:prstDash val="dot"/>
           </a:ln>
@@ -4434,6 +4474,902 @@
     <p:extLst>
       <p:ext uri="{BB962C8B-B14F-4D97-AF65-F5344CB8AC3E}">
         <p14:creationId xmlns:p14="http://schemas.microsoft.com/office/powerpoint/2010/main" val="2344692984"/>
+      </p:ext>
+    </p:extLst>
+  </p:cSld>
+  <p:clrMapOvr>
+    <a:masterClrMapping/>
+  </p:clrMapOvr>
+</p:sld>
+</file>
+
+<file path=ppt/slides/slide4.xml><?xml version="1.0" encoding="utf-8"?>
+<p:sld xmlns:a="http://schemas.openxmlformats.org/drawingml/2006/main" xmlns:r="http://schemas.openxmlformats.org/officeDocument/2006/relationships" xmlns:p="http://schemas.openxmlformats.org/presentationml/2006/main">
+  <p:cSld>
+    <p:spTree>
+      <p:nvGrpSpPr>
+        <p:cNvPr id="1" name=""/>
+        <p:cNvGrpSpPr/>
+        <p:nvPr/>
+      </p:nvGrpSpPr>
+      <p:grpSpPr>
+        <a:xfrm>
+          <a:off x="0" y="0"/>
+          <a:ext cx="0" cy="0"/>
+          <a:chOff x="0" y="0"/>
+          <a:chExt cx="0" cy="0"/>
+        </a:xfrm>
+      </p:grpSpPr>
+      <p:sp>
+        <p:nvSpPr>
+          <p:cNvPr id="6" name="TextBox 5"/>
+          <p:cNvSpPr txBox="1"/>
+          <p:nvPr/>
+        </p:nvSpPr>
+        <p:spPr>
+          <a:xfrm>
+            <a:off x="77202" y="4532473"/>
+            <a:ext cx="4724370" cy="2308324"/>
+          </a:xfrm>
+          <a:prstGeom prst="rect">
+            <a:avLst/>
+          </a:prstGeom>
+          <a:noFill/>
+        </p:spPr>
+        <p:txBody>
+          <a:bodyPr wrap="none" rtlCol="0">
+            <a:spAutoFit/>
+          </a:bodyPr>
+          <a:lstStyle/>
+          <a:p>
+            <a:r>
+              <a:rPr lang="en-US" sz="1200" dirty="0" smtClean="0"/>
+              <a:t>Early simulations, 9/2/13</a:t>
+            </a:r>
+          </a:p>
+          <a:p>
+            <a:r>
+              <a:rPr lang="en-US" sz="1200" dirty="0" smtClean="0"/>
+              <a:t>Trichromats: 4 L,  2 M, 1 S cone.  Poisson noise.  TAFC.</a:t>
+            </a:r>
+          </a:p>
+          <a:p>
+            <a:r>
+              <a:rPr lang="en-US" sz="1200" dirty="0" smtClean="0"/>
+              <a:t>CIE 2-deg fundamentals, quantum efficiency computed with PTB</a:t>
+            </a:r>
+          </a:p>
+          <a:p>
+            <a:r>
+              <a:rPr lang="en-US" sz="1200" dirty="0" smtClean="0"/>
+              <a:t>Apple LCD primaries, about 60 cd/m2 mean luminance</a:t>
+            </a:r>
+          </a:p>
+          <a:p>
+            <a:r>
+              <a:rPr lang="en-US" sz="1200" dirty="0" smtClean="0"/>
+              <a:t>Cone specific L/M surrounds, 0.7 surround weight.</a:t>
+            </a:r>
+          </a:p>
+          <a:p>
+            <a:r>
+              <a:rPr lang="en-US" sz="1200" dirty="0" smtClean="0"/>
+              <a:t>Gaussian noise at second site, </a:t>
+            </a:r>
+            <a:r>
+              <a:rPr lang="en-US" sz="1200" dirty="0" err="1" smtClean="0"/>
+              <a:t>Fano</a:t>
+            </a:r>
+            <a:r>
+              <a:rPr lang="en-US" sz="1200" dirty="0" smtClean="0"/>
+              <a:t> factor </a:t>
+            </a:r>
+            <a:r>
+              <a:rPr lang="en-US" sz="1200" dirty="0" smtClean="0"/>
+              <a:t>4.</a:t>
+            </a:r>
+            <a:endParaRPr lang="en-US" sz="1200" dirty="0" smtClean="0"/>
+          </a:p>
+          <a:p>
+            <a:r>
+              <a:rPr lang="en-US" sz="1200" dirty="0" smtClean="0"/>
+              <a:t>These are replacement dichromats, so the have:</a:t>
+            </a:r>
+          </a:p>
+          <a:p>
+            <a:r>
+              <a:rPr lang="en-US" sz="1200" dirty="0"/>
+              <a:t> </a:t>
+            </a:r>
+            <a:r>
+              <a:rPr lang="en-US" sz="1200" dirty="0" smtClean="0"/>
+              <a:t> 6 M, 1S (</a:t>
+            </a:r>
+            <a:r>
+              <a:rPr lang="en-US" sz="1200" dirty="0" err="1" smtClean="0"/>
+              <a:t>protanope</a:t>
+            </a:r>
+            <a:r>
+              <a:rPr lang="en-US" sz="1200" dirty="0" smtClean="0"/>
+              <a:t>), 6 L, 1 S (</a:t>
+            </a:r>
+            <a:r>
+              <a:rPr lang="en-US" sz="1200" dirty="0" err="1" smtClean="0"/>
+              <a:t>deuteranope</a:t>
+            </a:r>
+            <a:r>
+              <a:rPr lang="en-US" sz="1200" dirty="0" smtClean="0"/>
+              <a:t>)</a:t>
+            </a:r>
+          </a:p>
+          <a:p>
+            <a:r>
+              <a:rPr lang="en-US" sz="1200" dirty="0" smtClean="0">
+                <a:solidFill>
+                  <a:srgbClr val="FF0000"/>
+                </a:solidFill>
+              </a:rPr>
+              <a:t>This looks pretty much like the cone specific picture, but with</a:t>
+            </a:r>
+          </a:p>
+          <a:p>
+            <a:r>
+              <a:rPr lang="en-US" sz="1200" dirty="0" smtClean="0">
+                <a:solidFill>
+                  <a:srgbClr val="FF0000"/>
+                </a:solidFill>
+              </a:rPr>
+              <a:t>  slightly higher thresholds.  I don’t understand why the dichromats</a:t>
+            </a:r>
+          </a:p>
+          <a:p>
+            <a:r>
+              <a:rPr lang="en-US" sz="1200" dirty="0">
+                <a:solidFill>
+                  <a:srgbClr val="FF0000"/>
+                </a:solidFill>
+              </a:rPr>
+              <a:t> </a:t>
+            </a:r>
+            <a:r>
+              <a:rPr lang="en-US" sz="1200" dirty="0" smtClean="0">
+                <a:solidFill>
+                  <a:srgbClr val="FF0000"/>
+                </a:solidFill>
+              </a:rPr>
+              <a:t> differ, because with just one LM cone type I think the model is the same</a:t>
+            </a:r>
+          </a:p>
+          <a:p>
+            <a:r>
+              <a:rPr lang="en-US" sz="1200" dirty="0">
+                <a:solidFill>
+                  <a:srgbClr val="FF0000"/>
+                </a:solidFill>
+              </a:rPr>
+              <a:t> </a:t>
+            </a:r>
+            <a:r>
+              <a:rPr lang="en-US" sz="1200" dirty="0" smtClean="0">
+                <a:solidFill>
+                  <a:srgbClr val="FF0000"/>
+                </a:solidFill>
+              </a:rPr>
+              <a:t> with random and cone selective surrounds.</a:t>
+            </a:r>
+          </a:p>
+        </p:txBody>
+      </p:sp>
+      <p:sp>
+        <p:nvSpPr>
+          <p:cNvPr id="7" name="TextBox 6"/>
+          <p:cNvSpPr txBox="1"/>
+          <p:nvPr/>
+        </p:nvSpPr>
+        <p:spPr>
+          <a:xfrm>
+            <a:off x="203516" y="154684"/>
+            <a:ext cx="6218319" cy="369332"/>
+          </a:xfrm>
+          <a:prstGeom prst="rect">
+            <a:avLst/>
+          </a:prstGeom>
+          <a:noFill/>
+        </p:spPr>
+        <p:txBody>
+          <a:bodyPr wrap="none" rtlCol="0">
+            <a:spAutoFit/>
+          </a:bodyPr>
+          <a:lstStyle/>
+          <a:p>
+            <a:r>
+              <a:rPr lang="en-US" dirty="0" smtClean="0"/>
+              <a:t>SVM at Second Site, </a:t>
+            </a:r>
+            <a:r>
+              <a:rPr lang="en-US" dirty="0" smtClean="0"/>
+              <a:t>Second </a:t>
+            </a:r>
+            <a:r>
+              <a:rPr lang="en-US" dirty="0" smtClean="0"/>
+              <a:t>Site Noise, Cone </a:t>
+            </a:r>
+            <a:r>
+              <a:rPr lang="en-US" dirty="0" smtClean="0"/>
+              <a:t>Random </a:t>
+            </a:r>
+            <a:r>
+              <a:rPr lang="en-US" dirty="0" smtClean="0"/>
+              <a:t>Surrounds</a:t>
+            </a:r>
+            <a:endParaRPr lang="en-US" dirty="0"/>
+          </a:p>
+        </p:txBody>
+      </p:sp>
+      <p:pic>
+        <p:nvPicPr>
+          <p:cNvPr id="14" name="Picture 13" descr="colorContour_LMandS_TAFC_0.png"/>
+          <p:cNvPicPr>
+            <a:picLocks noChangeAspect="1"/>
+          </p:cNvPicPr>
+          <p:nvPr/>
+        </p:nvPicPr>
+        <p:blipFill>
+          <a:blip r:embed="rId2">
+            <a:extLst>
+              <a:ext uri="{28A0092B-C50C-407E-A947-70E740481C1C}">
+                <a14:useLocalDpi xmlns:a14="http://schemas.microsoft.com/office/drawing/2010/main" val="0"/>
+              </a:ext>
+            </a:extLst>
+          </a:blip>
+          <a:stretch>
+            <a:fillRect/>
+          </a:stretch>
+        </p:blipFill>
+        <p:spPr>
+          <a:xfrm>
+            <a:off x="4342385" y="814451"/>
+            <a:ext cx="3658616" cy="2743962"/>
+          </a:xfrm>
+          <a:prstGeom prst="rect">
+            <a:avLst/>
+          </a:prstGeom>
+        </p:spPr>
+      </p:pic>
+      <p:pic>
+        <p:nvPicPr>
+          <p:cNvPr id="16" name="Picture 15" descr="colorContour_LSonly_TAFC_0.png"/>
+          <p:cNvPicPr>
+            <a:picLocks noChangeAspect="1"/>
+          </p:cNvPicPr>
+          <p:nvPr/>
+        </p:nvPicPr>
+        <p:blipFill>
+          <a:blip r:embed="rId3">
+            <a:extLst>
+              <a:ext uri="{28A0092B-C50C-407E-A947-70E740481C1C}">
+                <a14:useLocalDpi xmlns:a14="http://schemas.microsoft.com/office/drawing/2010/main" val="0"/>
+              </a:ext>
+            </a:extLst>
+          </a:blip>
+          <a:stretch>
+            <a:fillRect/>
+          </a:stretch>
+        </p:blipFill>
+        <p:spPr>
+          <a:xfrm>
+            <a:off x="4357125" y="3875070"/>
+            <a:ext cx="3658616" cy="2743962"/>
+          </a:xfrm>
+          <a:prstGeom prst="rect">
+            <a:avLst/>
+          </a:prstGeom>
+        </p:spPr>
+      </p:pic>
+      <p:pic>
+        <p:nvPicPr>
+          <p:cNvPr id="18" name="Picture 17" descr="colorContour_MSonly_TAFC_0.png"/>
+          <p:cNvPicPr>
+            <a:picLocks noChangeAspect="1"/>
+          </p:cNvPicPr>
+          <p:nvPr/>
+        </p:nvPicPr>
+        <p:blipFill>
+          <a:blip r:embed="rId4">
+            <a:extLst>
+              <a:ext uri="{28A0092B-C50C-407E-A947-70E740481C1C}">
+                <a14:useLocalDpi xmlns:a14="http://schemas.microsoft.com/office/drawing/2010/main" val="0"/>
+              </a:ext>
+            </a:extLst>
+          </a:blip>
+          <a:stretch>
+            <a:fillRect/>
+          </a:stretch>
+        </p:blipFill>
+        <p:spPr>
+          <a:xfrm>
+            <a:off x="731397" y="814451"/>
+            <a:ext cx="3658616" cy="2743962"/>
+          </a:xfrm>
+          <a:prstGeom prst="rect">
+            <a:avLst/>
+          </a:prstGeom>
+        </p:spPr>
+      </p:pic>
+      <p:cxnSp>
+        <p:nvCxnSpPr>
+          <p:cNvPr id="10" name="Straight Connector 9"/>
+          <p:cNvCxnSpPr/>
+          <p:nvPr/>
+        </p:nvCxnSpPr>
+        <p:spPr>
+          <a:xfrm flipV="1">
+            <a:off x="6867688" y="1352925"/>
+            <a:ext cx="0" cy="5121193"/>
+          </a:xfrm>
+          <a:prstGeom prst="line">
+            <a:avLst/>
+          </a:prstGeom>
+          <a:ln w="6350" cmpd="sng">
+            <a:solidFill>
+              <a:srgbClr val="4F81BD"/>
+            </a:solidFill>
+            <a:prstDash val="dot"/>
+          </a:ln>
+          <a:effectLst/>
+        </p:spPr>
+        <p:style>
+          <a:lnRef idx="2">
+            <a:schemeClr val="accent1"/>
+          </a:lnRef>
+          <a:fillRef idx="0">
+            <a:schemeClr val="accent1"/>
+          </a:fillRef>
+          <a:effectRef idx="1">
+            <a:schemeClr val="accent1"/>
+          </a:effectRef>
+          <a:fontRef idx="minor">
+            <a:schemeClr val="tx1"/>
+          </a:fontRef>
+        </p:style>
+      </p:cxnSp>
+      <p:cxnSp>
+        <p:nvCxnSpPr>
+          <p:cNvPr id="12" name="Straight Connector 11"/>
+          <p:cNvCxnSpPr/>
+          <p:nvPr/>
+        </p:nvCxnSpPr>
+        <p:spPr>
+          <a:xfrm flipV="1">
+            <a:off x="5673752" y="1357687"/>
+            <a:ext cx="0" cy="5121193"/>
+          </a:xfrm>
+          <a:prstGeom prst="line">
+            <a:avLst/>
+          </a:prstGeom>
+          <a:ln w="6350" cmpd="sng">
+            <a:solidFill>
+              <a:srgbClr val="4F81BD"/>
+            </a:solidFill>
+            <a:prstDash val="dot"/>
+          </a:ln>
+          <a:effectLst/>
+        </p:spPr>
+        <p:style>
+          <a:lnRef idx="2">
+            <a:schemeClr val="accent1"/>
+          </a:lnRef>
+          <a:fillRef idx="0">
+            <a:schemeClr val="accent1"/>
+          </a:fillRef>
+          <a:effectRef idx="1">
+            <a:schemeClr val="accent1"/>
+          </a:effectRef>
+          <a:fontRef idx="minor">
+            <a:schemeClr val="tx1"/>
+          </a:fontRef>
+        </p:style>
+      </p:cxnSp>
+      <p:cxnSp>
+        <p:nvCxnSpPr>
+          <p:cNvPr id="20" name="Straight Connector 19"/>
+          <p:cNvCxnSpPr/>
+          <p:nvPr/>
+        </p:nvCxnSpPr>
+        <p:spPr>
+          <a:xfrm flipH="1">
+            <a:off x="1381580" y="1474107"/>
+            <a:ext cx="5374978" cy="1"/>
+          </a:xfrm>
+          <a:prstGeom prst="line">
+            <a:avLst/>
+          </a:prstGeom>
+          <a:ln w="6350" cmpd="sng">
+            <a:solidFill>
+              <a:srgbClr val="4F81BD"/>
+            </a:solidFill>
+            <a:prstDash val="dot"/>
+          </a:ln>
+          <a:effectLst/>
+        </p:spPr>
+        <p:style>
+          <a:lnRef idx="2">
+            <a:schemeClr val="accent1"/>
+          </a:lnRef>
+          <a:fillRef idx="0">
+            <a:schemeClr val="accent1"/>
+          </a:fillRef>
+          <a:effectRef idx="1">
+            <a:schemeClr val="accent1"/>
+          </a:effectRef>
+          <a:fontRef idx="minor">
+            <a:schemeClr val="tx1"/>
+          </a:fontRef>
+        </p:style>
+      </p:cxnSp>
+      <p:cxnSp>
+        <p:nvCxnSpPr>
+          <p:cNvPr id="21" name="Straight Connector 20"/>
+          <p:cNvCxnSpPr/>
+          <p:nvPr/>
+        </p:nvCxnSpPr>
+        <p:spPr>
+          <a:xfrm flipH="1">
+            <a:off x="1401902" y="2903344"/>
+            <a:ext cx="5354654" cy="0"/>
+          </a:xfrm>
+          <a:prstGeom prst="line">
+            <a:avLst/>
+          </a:prstGeom>
+          <a:ln w="6350" cmpd="sng">
+            <a:solidFill>
+              <a:srgbClr val="4F81BD"/>
+            </a:solidFill>
+            <a:prstDash val="dot"/>
+          </a:ln>
+          <a:effectLst/>
+        </p:spPr>
+        <p:style>
+          <a:lnRef idx="2">
+            <a:schemeClr val="accent1"/>
+          </a:lnRef>
+          <a:fillRef idx="0">
+            <a:schemeClr val="accent1"/>
+          </a:fillRef>
+          <a:effectRef idx="1">
+            <a:schemeClr val="accent1"/>
+          </a:effectRef>
+          <a:fontRef idx="minor">
+            <a:schemeClr val="tx1"/>
+          </a:fontRef>
+        </p:style>
+      </p:cxnSp>
+    </p:spTree>
+    <p:extLst>
+      <p:ext uri="{BB962C8B-B14F-4D97-AF65-F5344CB8AC3E}">
+        <p14:creationId xmlns:p14="http://schemas.microsoft.com/office/powerpoint/2010/main" val="3844727670"/>
+      </p:ext>
+    </p:extLst>
+  </p:cSld>
+  <p:clrMapOvr>
+    <a:masterClrMapping/>
+  </p:clrMapOvr>
+</p:sld>
+</file>
+
+<file path=ppt/slides/slide5.xml><?xml version="1.0" encoding="utf-8"?>
+<p:sld xmlns:a="http://schemas.openxmlformats.org/drawingml/2006/main" xmlns:r="http://schemas.openxmlformats.org/officeDocument/2006/relationships" xmlns:p="http://schemas.openxmlformats.org/presentationml/2006/main">
+  <p:cSld>
+    <p:spTree>
+      <p:nvGrpSpPr>
+        <p:cNvPr id="1" name=""/>
+        <p:cNvGrpSpPr/>
+        <p:nvPr/>
+      </p:nvGrpSpPr>
+      <p:grpSpPr>
+        <a:xfrm>
+          <a:off x="0" y="0"/>
+          <a:ext cx="0" cy="0"/>
+          <a:chOff x="0" y="0"/>
+          <a:chExt cx="0" cy="0"/>
+        </a:xfrm>
+      </p:grpSpPr>
+      <p:sp>
+        <p:nvSpPr>
+          <p:cNvPr id="6" name="TextBox 5"/>
+          <p:cNvSpPr txBox="1"/>
+          <p:nvPr/>
+        </p:nvSpPr>
+        <p:spPr>
+          <a:xfrm>
+            <a:off x="77202" y="5167513"/>
+            <a:ext cx="4508716" cy="1569660"/>
+          </a:xfrm>
+          <a:prstGeom prst="rect">
+            <a:avLst/>
+          </a:prstGeom>
+          <a:noFill/>
+        </p:spPr>
+        <p:txBody>
+          <a:bodyPr wrap="none" rtlCol="0">
+            <a:spAutoFit/>
+          </a:bodyPr>
+          <a:lstStyle/>
+          <a:p>
+            <a:r>
+              <a:rPr lang="en-US" sz="1200" dirty="0" smtClean="0"/>
+              <a:t>Early simulations, 9/2/13</a:t>
+            </a:r>
+          </a:p>
+          <a:p>
+            <a:r>
+              <a:rPr lang="en-US" sz="1200" dirty="0" smtClean="0"/>
+              <a:t>Trichromats: 4 L,  2 M, 1 S cone.  Poisson noise.  TAFC.</a:t>
+            </a:r>
+          </a:p>
+          <a:p>
+            <a:r>
+              <a:rPr lang="en-US" sz="1200" dirty="0" smtClean="0"/>
+              <a:t>CIE 2-deg fundamentals, quantum efficiency computed with PTB</a:t>
+            </a:r>
+          </a:p>
+          <a:p>
+            <a:r>
+              <a:rPr lang="en-US" sz="1200" dirty="0" smtClean="0"/>
+              <a:t>Apple LCD primaries, about 60 cd/m2 mean luminance</a:t>
+            </a:r>
+          </a:p>
+          <a:p>
+            <a:r>
+              <a:rPr lang="en-US" sz="1200" dirty="0" smtClean="0"/>
+              <a:t>Upper right panel, SVM at cones.</a:t>
+            </a:r>
+          </a:p>
+          <a:p>
+            <a:r>
+              <a:rPr lang="en-US" sz="1200" dirty="0" smtClean="0"/>
+              <a:t>Upper left and lower right panels (both same), SVM at opponent site.</a:t>
+            </a:r>
+          </a:p>
+          <a:p>
+            <a:r>
+              <a:rPr lang="en-US" sz="1200" dirty="0" smtClean="0">
+                <a:solidFill>
+                  <a:srgbClr val="FF0000"/>
+                </a:solidFill>
+              </a:rPr>
+              <a:t>This </a:t>
+            </a:r>
+            <a:r>
+              <a:rPr lang="en-US" sz="1200" dirty="0" smtClean="0">
+                <a:solidFill>
+                  <a:srgbClr val="FF0000"/>
+                </a:solidFill>
+              </a:rPr>
+              <a:t>looks like putting the SVM at the cones, which is should since</a:t>
+            </a:r>
+          </a:p>
+          <a:p>
+            <a:r>
+              <a:rPr lang="en-US" sz="1200" dirty="0">
+                <a:solidFill>
+                  <a:srgbClr val="FF0000"/>
+                </a:solidFill>
+              </a:rPr>
+              <a:t> </a:t>
+            </a:r>
+            <a:r>
+              <a:rPr lang="en-US" sz="1200" dirty="0" smtClean="0">
+                <a:solidFill>
+                  <a:srgbClr val="FF0000"/>
+                </a:solidFill>
+              </a:rPr>
+              <a:t> without second site noise the information </a:t>
+            </a:r>
+            <a:r>
+              <a:rPr lang="en-US" sz="1200" smtClean="0">
+                <a:solidFill>
+                  <a:srgbClr val="FF0000"/>
+                </a:solidFill>
+              </a:rPr>
+              <a:t>is unchanged.</a:t>
+            </a:r>
+            <a:endParaRPr lang="en-US" sz="1200" dirty="0">
+              <a:solidFill>
+                <a:srgbClr val="FF0000"/>
+              </a:solidFill>
+            </a:endParaRPr>
+          </a:p>
+        </p:txBody>
+      </p:sp>
+      <p:sp>
+        <p:nvSpPr>
+          <p:cNvPr id="7" name="TextBox 6"/>
+          <p:cNvSpPr txBox="1"/>
+          <p:nvPr/>
+        </p:nvSpPr>
+        <p:spPr>
+          <a:xfrm>
+            <a:off x="203516" y="154684"/>
+            <a:ext cx="4097433" cy="369332"/>
+          </a:xfrm>
+          <a:prstGeom prst="rect">
+            <a:avLst/>
+          </a:prstGeom>
+          <a:noFill/>
+        </p:spPr>
+        <p:txBody>
+          <a:bodyPr wrap="none" rtlCol="0">
+            <a:spAutoFit/>
+          </a:bodyPr>
+          <a:lstStyle/>
+          <a:p>
+            <a:r>
+              <a:rPr lang="en-US" dirty="0" smtClean="0"/>
+              <a:t>SVM at </a:t>
+            </a:r>
+            <a:r>
+              <a:rPr lang="en-US" dirty="0" smtClean="0"/>
+              <a:t>Second </a:t>
+            </a:r>
+            <a:r>
+              <a:rPr lang="en-US" dirty="0" smtClean="0"/>
+              <a:t>Site, No </a:t>
+            </a:r>
+            <a:r>
+              <a:rPr lang="en-US" dirty="0" smtClean="0"/>
+              <a:t>Second </a:t>
+            </a:r>
+            <a:r>
+              <a:rPr lang="en-US" dirty="0" smtClean="0"/>
+              <a:t>Site Noise</a:t>
+            </a:r>
+            <a:endParaRPr lang="en-US" dirty="0"/>
+          </a:p>
+        </p:txBody>
+      </p:sp>
+      <p:pic>
+        <p:nvPicPr>
+          <p:cNvPr id="5" name="Picture 4" descr="colorContour_LMandS_TAFC_0.png"/>
+          <p:cNvPicPr>
+            <a:picLocks noChangeAspect="1"/>
+          </p:cNvPicPr>
+          <p:nvPr/>
+        </p:nvPicPr>
+        <p:blipFill>
+          <a:blip r:embed="rId2">
+            <a:extLst>
+              <a:ext uri="{28A0092B-C50C-407E-A947-70E740481C1C}">
+                <a14:useLocalDpi xmlns:a14="http://schemas.microsoft.com/office/drawing/2010/main" val="0"/>
+              </a:ext>
+            </a:extLst>
+          </a:blip>
+          <a:stretch>
+            <a:fillRect/>
+          </a:stretch>
+        </p:blipFill>
+        <p:spPr>
+          <a:xfrm>
+            <a:off x="4402349" y="871931"/>
+            <a:ext cx="3657357" cy="2743017"/>
+          </a:xfrm>
+          <a:prstGeom prst="rect">
+            <a:avLst/>
+          </a:prstGeom>
+        </p:spPr>
+      </p:pic>
+      <p:pic>
+        <p:nvPicPr>
+          <p:cNvPr id="15" name="Picture 14" descr="colorContour_LMandS_TAFC_0.png"/>
+          <p:cNvPicPr>
+            <a:picLocks noChangeAspect="1"/>
+          </p:cNvPicPr>
+          <p:nvPr/>
+        </p:nvPicPr>
+        <p:blipFill>
+          <a:blip r:embed="rId3">
+            <a:extLst>
+              <a:ext uri="{28A0092B-C50C-407E-A947-70E740481C1C}">
+                <a14:useLocalDpi xmlns:a14="http://schemas.microsoft.com/office/drawing/2010/main" val="0"/>
+              </a:ext>
+            </a:extLst>
+          </a:blip>
+          <a:stretch>
+            <a:fillRect/>
+          </a:stretch>
+        </p:blipFill>
+        <p:spPr>
+          <a:xfrm>
+            <a:off x="4402349" y="3941288"/>
+            <a:ext cx="3657357" cy="2743017"/>
+          </a:xfrm>
+          <a:prstGeom prst="rect">
+            <a:avLst/>
+          </a:prstGeom>
+        </p:spPr>
+      </p:pic>
+      <p:pic>
+        <p:nvPicPr>
+          <p:cNvPr id="16" name="Picture 15" descr="colorContour_LMandS_TAFC_0.png"/>
+          <p:cNvPicPr>
+            <a:picLocks noChangeAspect="1"/>
+          </p:cNvPicPr>
+          <p:nvPr/>
+        </p:nvPicPr>
+        <p:blipFill>
+          <a:blip r:embed="rId3">
+            <a:extLst>
+              <a:ext uri="{28A0092B-C50C-407E-A947-70E740481C1C}">
+                <a14:useLocalDpi xmlns:a14="http://schemas.microsoft.com/office/drawing/2010/main" val="0"/>
+              </a:ext>
+            </a:extLst>
+          </a:blip>
+          <a:stretch>
+            <a:fillRect/>
+          </a:stretch>
+        </p:blipFill>
+        <p:spPr>
+          <a:xfrm>
+            <a:off x="764649" y="871931"/>
+            <a:ext cx="3657357" cy="2743017"/>
+          </a:xfrm>
+          <a:prstGeom prst="rect">
+            <a:avLst/>
+          </a:prstGeom>
+        </p:spPr>
+      </p:pic>
+      <p:cxnSp>
+        <p:nvCxnSpPr>
+          <p:cNvPr id="10" name="Straight Connector 9"/>
+          <p:cNvCxnSpPr/>
+          <p:nvPr/>
+        </p:nvCxnSpPr>
+        <p:spPr>
+          <a:xfrm flipV="1">
+            <a:off x="6407680" y="1352925"/>
+            <a:ext cx="0" cy="5121193"/>
+          </a:xfrm>
+          <a:prstGeom prst="line">
+            <a:avLst/>
+          </a:prstGeom>
+          <a:ln w="6350" cmpd="sng">
+            <a:solidFill>
+              <a:srgbClr val="4F81BD"/>
+            </a:solidFill>
+            <a:prstDash val="dot"/>
+          </a:ln>
+          <a:effectLst/>
+        </p:spPr>
+        <p:style>
+          <a:lnRef idx="2">
+            <a:schemeClr val="accent1"/>
+          </a:lnRef>
+          <a:fillRef idx="0">
+            <a:schemeClr val="accent1"/>
+          </a:fillRef>
+          <a:effectRef idx="1">
+            <a:schemeClr val="accent1"/>
+          </a:effectRef>
+          <a:fontRef idx="minor">
+            <a:schemeClr val="tx1"/>
+          </a:fontRef>
+        </p:style>
+      </p:cxnSp>
+      <p:cxnSp>
+        <p:nvCxnSpPr>
+          <p:cNvPr id="12" name="Straight Connector 11"/>
+          <p:cNvCxnSpPr/>
+          <p:nvPr/>
+        </p:nvCxnSpPr>
+        <p:spPr>
+          <a:xfrm flipV="1">
+            <a:off x="6040080" y="1405315"/>
+            <a:ext cx="0" cy="5121193"/>
+          </a:xfrm>
+          <a:prstGeom prst="line">
+            <a:avLst/>
+          </a:prstGeom>
+          <a:ln w="6350" cmpd="sng">
+            <a:solidFill>
+              <a:srgbClr val="4F81BD"/>
+            </a:solidFill>
+            <a:prstDash val="dot"/>
+          </a:ln>
+          <a:effectLst/>
+        </p:spPr>
+        <p:style>
+          <a:lnRef idx="2">
+            <a:schemeClr val="accent1"/>
+          </a:lnRef>
+          <a:fillRef idx="0">
+            <a:schemeClr val="accent1"/>
+          </a:fillRef>
+          <a:effectRef idx="1">
+            <a:schemeClr val="accent1"/>
+          </a:effectRef>
+          <a:fontRef idx="minor">
+            <a:schemeClr val="tx1"/>
+          </a:fontRef>
+        </p:style>
+      </p:cxnSp>
+      <p:cxnSp>
+        <p:nvCxnSpPr>
+          <p:cNvPr id="13" name="Straight Connector 12"/>
+          <p:cNvCxnSpPr/>
+          <p:nvPr/>
+        </p:nvCxnSpPr>
+        <p:spPr>
+          <a:xfrm rot="16200000" flipV="1">
+            <a:off x="3942434" y="-692452"/>
+            <a:ext cx="0" cy="5121193"/>
+          </a:xfrm>
+          <a:prstGeom prst="line">
+            <a:avLst/>
+          </a:prstGeom>
+          <a:ln w="6350" cmpd="sng">
+            <a:solidFill>
+              <a:srgbClr val="4F81BD"/>
+            </a:solidFill>
+            <a:prstDash val="dot"/>
+          </a:ln>
+          <a:effectLst/>
+        </p:spPr>
+        <p:style>
+          <a:lnRef idx="2">
+            <a:schemeClr val="accent1"/>
+          </a:lnRef>
+          <a:fillRef idx="0">
+            <a:schemeClr val="accent1"/>
+          </a:fillRef>
+          <a:effectRef idx="1">
+            <a:schemeClr val="accent1"/>
+          </a:effectRef>
+          <a:fontRef idx="minor">
+            <a:schemeClr val="tx1"/>
+          </a:fontRef>
+        </p:style>
+      </p:cxnSp>
+      <p:cxnSp>
+        <p:nvCxnSpPr>
+          <p:cNvPr id="14" name="Straight Connector 13"/>
+          <p:cNvCxnSpPr/>
+          <p:nvPr/>
+        </p:nvCxnSpPr>
+        <p:spPr>
+          <a:xfrm rot="16200000" flipV="1">
+            <a:off x="3962434" y="-15"/>
+            <a:ext cx="0" cy="5121193"/>
+          </a:xfrm>
+          <a:prstGeom prst="line">
+            <a:avLst/>
+          </a:prstGeom>
+          <a:ln w="6350" cmpd="sng">
+            <a:solidFill>
+              <a:srgbClr val="4F81BD"/>
+            </a:solidFill>
+            <a:prstDash val="dot"/>
+          </a:ln>
+          <a:effectLst/>
+        </p:spPr>
+        <p:style>
+          <a:lnRef idx="2">
+            <a:schemeClr val="accent1"/>
+          </a:lnRef>
+          <a:fillRef idx="0">
+            <a:schemeClr val="accent1"/>
+          </a:fillRef>
+          <a:effectRef idx="1">
+            <a:schemeClr val="accent1"/>
+          </a:effectRef>
+          <a:fontRef idx="minor">
+            <a:schemeClr val="tx1"/>
+          </a:fontRef>
+        </p:style>
+      </p:cxnSp>
+    </p:spTree>
+    <p:extLst>
+      <p:ext uri="{BB962C8B-B14F-4D97-AF65-F5344CB8AC3E}">
+        <p14:creationId xmlns:p14="http://schemas.microsoft.com/office/powerpoint/2010/main" val="1909455126"/>
       </p:ext>
     </p:extLst>
   </p:cSld>

</xml_diff>

<commit_message>
A few last comment tweaks.
Signed-off-by: David Brainard <brainard@psych.upenn.edu>
</commit_message>
<xml_diff>
--- a/colorContours/presentations/EarlyResultsSeptember2013.pptx
+++ b/colorContours/presentations/EarlyResultsSeptember2013.pptx
@@ -3107,8 +3107,8 @@
         </p:nvSpPr>
         <p:spPr>
           <a:xfrm>
-            <a:off x="77202" y="5167513"/>
-            <a:ext cx="4397433" cy="1754327"/>
+            <a:off x="77202" y="4881765"/>
+            <a:ext cx="4435980" cy="1938992"/>
           </a:xfrm>
           <a:prstGeom prst="rect">
             <a:avLst/>
@@ -3201,15 +3201,7 @@
                   <a:srgbClr val="FF0000"/>
                 </a:solidFill>
               </a:rPr>
-              <a:t> relevant isolating direction.  Yes for M, not so much for </a:t>
-            </a:r>
-            <a:r>
-              <a:rPr lang="en-US" sz="1200" dirty="0" smtClean="0">
-                <a:solidFill>
-                  <a:srgbClr val="FF0000"/>
-                </a:solidFill>
-              </a:rPr>
-              <a:t>L.  The </a:t>
+              <a:t> relevant isolating direction.  Yes for M, not so much for L.  The </a:t>
             </a:r>
             <a:r>
               <a:rPr lang="en-US" sz="1200" dirty="0" err="1" smtClean="0">
@@ -3256,7 +3248,49 @@
                   <a:srgbClr val="FF0000"/>
                 </a:solidFill>
               </a:rPr>
-              <a:t> of 2.  That might be some of it.</a:t>
+              <a:t> of </a:t>
+            </a:r>
+            <a:r>
+              <a:rPr lang="en-US" sz="1200" dirty="0" smtClean="0">
+                <a:solidFill>
+                  <a:srgbClr val="FF0000"/>
+                </a:solidFill>
+              </a:rPr>
+              <a:t>3.  </a:t>
+            </a:r>
+            <a:r>
+              <a:rPr lang="en-US" sz="1200" dirty="0" smtClean="0">
+                <a:solidFill>
+                  <a:srgbClr val="FF0000"/>
+                </a:solidFill>
+              </a:rPr>
+              <a:t>That might be </a:t>
+            </a:r>
+            <a:r>
+              <a:rPr lang="en-US" sz="1200" dirty="0" smtClean="0">
+                <a:solidFill>
+                  <a:srgbClr val="FF0000"/>
+                </a:solidFill>
+              </a:rPr>
+              <a:t>it.  I haven’t checked</a:t>
+            </a:r>
+          </a:p>
+          <a:p>
+            <a:r>
+              <a:rPr lang="en-US" sz="1200" dirty="0">
+                <a:solidFill>
+                  <a:srgbClr val="FF0000"/>
+                </a:solidFill>
+              </a:rPr>
+              <a:t> </a:t>
+            </a:r>
+            <a:r>
+              <a:rPr lang="en-US" sz="1200" dirty="0" smtClean="0">
+                <a:solidFill>
+                  <a:srgbClr val="FF0000"/>
+                </a:solidFill>
+              </a:rPr>
+              <a:t> in detail.</a:t>
             </a:r>
             <a:endParaRPr lang="en-US" sz="1200" dirty="0">
               <a:solidFill>
@@ -3663,13 +3697,8 @@
             </a:r>
             <a:r>
               <a:rPr lang="en-US" sz="1200" dirty="0" smtClean="0"/>
-              <a:t> factor </a:t>
-            </a:r>
-            <a:r>
-              <a:rPr lang="en-US" sz="1200" dirty="0" smtClean="0"/>
-              <a:t>4.</a:t>
-            </a:r>
-            <a:endParaRPr lang="en-US" sz="1200" dirty="0" smtClean="0"/>
+              <a:t> factor 4.</a:t>
+            </a:r>
           </a:p>
           <a:p>
             <a:r>
@@ -3748,11 +3777,6 @@
               </a:rPr>
               <a:t> although I don’t yet have a clean formal argument.</a:t>
             </a:r>
-            <a:endParaRPr lang="en-US" sz="1200" dirty="0" smtClean="0">
-              <a:solidFill>
-                <a:srgbClr val="FF0000"/>
-              </a:solidFill>
-            </a:endParaRPr>
           </a:p>
         </p:txBody>
       </p:sp>
@@ -3780,15 +3804,7 @@
           <a:p>
             <a:r>
               <a:rPr lang="en-US" dirty="0" smtClean="0"/>
-              <a:t>SVM at Second Site, </a:t>
-            </a:r>
-            <a:r>
-              <a:rPr lang="en-US" dirty="0" smtClean="0"/>
-              <a:t>Second </a:t>
-            </a:r>
-            <a:r>
-              <a:rPr lang="en-US" dirty="0" smtClean="0"/>
-              <a:t>Site Noise, Cone Specific Surrounds</a:t>
+              <a:t>SVM at Second Site, Second Site Noise, Cone Specific Surrounds</a:t>
             </a:r>
             <a:endParaRPr lang="en-US" dirty="0"/>
           </a:p>
@@ -4186,11 +4202,6 @@
               </a:rPr>
               <a:t> cones and the case where there is more noise at the second site.</a:t>
             </a:r>
-            <a:endParaRPr lang="en-US" sz="1200" dirty="0" smtClean="0">
-              <a:solidFill>
-                <a:srgbClr val="FF0000"/>
-              </a:solidFill>
-            </a:endParaRPr>
           </a:p>
         </p:txBody>
       </p:sp>
@@ -4218,15 +4229,7 @@
           <a:p>
             <a:r>
               <a:rPr lang="en-US" dirty="0" smtClean="0"/>
-              <a:t>SVM at Second Site, </a:t>
-            </a:r>
-            <a:r>
-              <a:rPr lang="en-US" dirty="0" smtClean="0"/>
-              <a:t>Less Second </a:t>
-            </a:r>
-            <a:r>
-              <a:rPr lang="en-US" dirty="0" smtClean="0"/>
-              <a:t>Site Noise, Cone Specific Surrounds</a:t>
+              <a:t>SVM at Second Site, Less Second Site Noise, Cone Specific Surrounds</a:t>
             </a:r>
             <a:endParaRPr lang="en-US" dirty="0"/>
           </a:p>
@@ -4562,13 +4565,8 @@
             </a:r>
             <a:r>
               <a:rPr lang="en-US" sz="1200" dirty="0" smtClean="0"/>
-              <a:t> factor </a:t>
-            </a:r>
-            <a:r>
-              <a:rPr lang="en-US" sz="1200" dirty="0" smtClean="0"/>
-              <a:t>4.</a:t>
-            </a:r>
-            <a:endParaRPr lang="en-US" sz="1200" dirty="0" smtClean="0"/>
+              <a:t> factor 4.</a:t>
+            </a:r>
           </a:p>
           <a:p>
             <a:r>
@@ -4684,23 +4682,7 @@
           <a:p>
             <a:r>
               <a:rPr lang="en-US" dirty="0" smtClean="0"/>
-              <a:t>SVM at Second Site, </a:t>
-            </a:r>
-            <a:r>
-              <a:rPr lang="en-US" dirty="0" smtClean="0"/>
-              <a:t>Second </a:t>
-            </a:r>
-            <a:r>
-              <a:rPr lang="en-US" dirty="0" smtClean="0"/>
-              <a:t>Site Noise, Cone </a:t>
-            </a:r>
-            <a:r>
-              <a:rPr lang="en-US" dirty="0" smtClean="0"/>
-              <a:t>Random </a:t>
-            </a:r>
-            <a:r>
-              <a:rPr lang="en-US" dirty="0" smtClean="0"/>
-              <a:t>Surrounds</a:t>
+              <a:t>SVM at Second Site, Second Site Noise, Cone Random Surrounds</a:t>
             </a:r>
             <a:endParaRPr lang="en-US" dirty="0"/>
           </a:p>
@@ -5106,23 +5088,7 @@
           <a:p>
             <a:r>
               <a:rPr lang="en-US" dirty="0" smtClean="0"/>
-              <a:t>SVM at </a:t>
-            </a:r>
-            <a:r>
-              <a:rPr lang="en-US" dirty="0" smtClean="0"/>
-              <a:t>Second </a:t>
-            </a:r>
-            <a:r>
-              <a:rPr lang="en-US" dirty="0" smtClean="0"/>
-              <a:t>Site, No </a:t>
-            </a:r>
-            <a:r>
-              <a:rPr lang="en-US" dirty="0" smtClean="0"/>
-              <a:t>Second </a:t>
-            </a:r>
-            <a:r>
-              <a:rPr lang="en-US" dirty="0" smtClean="0"/>
-              <a:t>Site Noise</a:t>
+              <a:t>SVM at Second Site, No Second Site Noise</a:t>
             </a:r>
             <a:endParaRPr lang="en-US" dirty="0"/>
           </a:p>

</xml_diff>